<commit_message>
Update to 2015 April course
</commit_message>
<xml_diff>
--- a/EBI_NGS_rsvc_slides.pptx
+++ b/EBI_NGS_rsvc_slides.pptx
@@ -243,7 +243,7 @@
           <a:p>
             <a:fld id="{683B11D8-A7E4-EF43-B6E1-02D8D0F96BD3}" type="datetimeFigureOut">
               <a:rPr lang="en-US" smtClean="0"/>
-              <a:t>28/10/2014</a:t>
+              <a:t>14/04/15</a:t>
             </a:fld>
             <a:endParaRPr lang="en-US"/>
           </a:p>
@@ -409,7 +409,7 @@
             <a:fld id="{62009DDE-F922-854C-BEFF-CE1DF0F32BA2}" type="datetimeFigureOut">
               <a:rPr lang="en-US" smtClean="0"/>
               <a:pPr/>
-              <a:t>28/10/2014</a:t>
+              <a:t>14/04/15</a:t>
             </a:fld>
             <a:endParaRPr lang="en-US"/>
           </a:p>
@@ -2650,7 +2650,7 @@
             <a:fld id="{839ABAFC-AAE2-164B-92D4-13A10F0236EE}" type="datetimeFigureOut">
               <a:rPr lang="en-US" smtClean="0"/>
               <a:pPr/>
-              <a:t>28/10/2014</a:t>
+              <a:t>14/04/15</a:t>
             </a:fld>
             <a:endParaRPr lang="en-US"/>
           </a:p>
@@ -4261,7 +4261,7 @@
             </a:r>
             <a:r>
               <a:rPr lang="en-GB" sz="1000" dirty="0" smtClean="0"/>
-              <a:t>28</a:t>
+              <a:t>14</a:t>
             </a:r>
             <a:r>
               <a:rPr lang="en-GB" sz="1000" baseline="30000" dirty="0" smtClean="0"/>
@@ -4269,7 +4269,7 @@
             </a:r>
             <a:r>
               <a:rPr lang="en-GB" sz="1000" dirty="0" smtClean="0"/>
-              <a:t> October, 2014</a:t>
+              <a:t> April 2015</a:t>
             </a:r>
             <a:endParaRPr lang="en-GB" sz="1000" dirty="0"/>
           </a:p>
@@ -22199,11 +22199,7 @@
           <a:p>
             <a:r>
               <a:rPr lang="en-US" dirty="0" smtClean="0"/>
-              <a:t>Two similar dynamic programming algorithms </a:t>
-            </a:r>
-            <a:r>
-              <a:rPr lang="en-US" dirty="0" smtClean="0"/>
-              <a:t>for generating the optimal pairwise alignment between two sequences</a:t>
+              <a:t>Two similar dynamic programming algorithms for generating the optimal pairwise alignment between two sequences</a:t>
             </a:r>
           </a:p>
           <a:p>
@@ -22219,11 +22215,7 @@
             <a:pPr lvl="1"/>
             <a:r>
               <a:rPr lang="en-US" dirty="0" smtClean="0"/>
-              <a:t>In NGS, only </a:t>
-            </a:r>
-            <a:r>
-              <a:rPr lang="en-US" dirty="0" smtClean="0"/>
-              <a:t>applied to a small subset of the reads that don’t have an exact match</a:t>
+              <a:t>In NGS, only applied to a small subset of the reads that don’t have an exact match</a:t>
             </a:r>
           </a:p>
           <a:p>

</xml_diff>

<commit_message>
Update to 2015 September course
</commit_message>
<xml_diff>
--- a/EBI_NGS_rsvc_slides.pptx
+++ b/EBI_NGS_rsvc_slides.pptx
@@ -243,7 +243,7 @@
           <a:p>
             <a:fld id="{683B11D8-A7E4-EF43-B6E1-02D8D0F96BD3}" type="datetimeFigureOut">
               <a:rPr lang="en-US" smtClean="0"/>
-              <a:t>14/04/15</a:t>
+              <a:t>28/09/15</a:t>
             </a:fld>
             <a:endParaRPr lang="en-US"/>
           </a:p>
@@ -409,7 +409,7 @@
             <a:fld id="{62009DDE-F922-854C-BEFF-CE1DF0F32BA2}" type="datetimeFigureOut">
               <a:rPr lang="en-US" smtClean="0"/>
               <a:pPr/>
-              <a:t>14/04/15</a:t>
+              <a:t>28/09/15</a:t>
             </a:fld>
             <a:endParaRPr lang="en-US"/>
           </a:p>
@@ -2650,7 +2650,7 @@
             <a:fld id="{839ABAFC-AAE2-164B-92D4-13A10F0236EE}" type="datetimeFigureOut">
               <a:rPr lang="en-US" smtClean="0"/>
               <a:pPr/>
-              <a:t>14/04/15</a:t>
+              <a:t>28/09/15</a:t>
             </a:fld>
             <a:endParaRPr lang="en-US"/>
           </a:p>
@@ -4261,7 +4261,7 @@
             </a:r>
             <a:r>
               <a:rPr lang="en-GB" sz="1000" dirty="0" smtClean="0"/>
-              <a:t>14</a:t>
+              <a:t>30</a:t>
             </a:r>
             <a:r>
               <a:rPr lang="en-GB" sz="1000" baseline="30000" dirty="0" smtClean="0"/>
@@ -4269,7 +4269,11 @@
             </a:r>
             <a:r>
               <a:rPr lang="en-GB" sz="1000" dirty="0" smtClean="0"/>
-              <a:t> April 2015</a:t>
+              <a:t> September </a:t>
+            </a:r>
+            <a:r>
+              <a:rPr lang="en-GB" sz="1000" dirty="0" smtClean="0"/>
+              <a:t>2015</a:t>
             </a:r>
             <a:endParaRPr lang="en-GB" sz="1000" dirty="0"/>
           </a:p>

</xml_diff>